<commit_message>
updated link to other editions page
</commit_message>
<xml_diff>
--- a/IoTASAP2017/images/IoT-ASAP_Logo.pptx
+++ b/IoTASAP2017/images/IoT-ASAP_Logo.pptx
@@ -4035,9 +4035,9 @@
     <p:bg>
       <p:bgPr>
         <a:solidFill>
-          <a:schemeClr val="bg1">
+          <a:srgbClr val="FFFFFF">
             <a:alpha val="0"/>
-          </a:schemeClr>
+          </a:srgbClr>
         </a:solidFill>
         <a:effectLst/>
       </p:bgPr>

</xml_diff>